<commit_message>
Erster Content in 00-Einführung, neue Diagrame
</commit_message>
<xml_diff>
--- a/graphics/venom-diagrams.pptx
+++ b/graphics/venom-diagrams.pptx
@@ -201,7 +201,7 @@
           <a:p>
             <a:fld id="{1C8FE042-0B66-6B40-B0E0-26B8EBC13308}" type="datetimeFigureOut">
               <a:rPr lang="de-DE" smtClean="0"/>
-              <a:t>10.04.15</a:t>
+              <a:t>11.04.15</a:t>
             </a:fld>
             <a:endParaRPr lang="de-DE"/>
           </a:p>
@@ -1702,15 +1702,7 @@
           <a:p>
             <a:r>
               <a:rPr lang="de-DE" dirty="0" smtClean="0"/>
-              <a:t>just </a:t>
-            </a:r>
-            <a:r>
-              <a:rPr lang="de-DE" dirty="0" smtClean="0"/>
-              <a:t>a </a:t>
-            </a:r>
-            <a:r>
-              <a:rPr lang="de-DE" dirty="0" smtClean="0"/>
-              <a:t>web </a:t>
+              <a:t>just a web </a:t>
             </a:r>
             <a:r>
               <a:rPr lang="de-DE" dirty="0" err="1" smtClean="0"/>
@@ -1719,10 +1711,6 @@
             <a:r>
               <a:rPr lang="de-DE" dirty="0" smtClean="0"/>
               <a:t>:</a:t>
-            </a:r>
-            <a:r>
-              <a:rPr lang="de-DE" dirty="0" smtClean="0"/>
-              <a:t/>
             </a:r>
             <a:br>
               <a:rPr lang="de-DE" dirty="0" smtClean="0"/>
@@ -2668,44 +2656,6 @@
           <a:chExt cx="0" cy="0"/>
         </a:xfrm>
       </p:grpSpPr>
-      <p:sp>
-        <p:nvSpPr>
-          <p:cNvPr id="2" name="Titel 1"/>
-          <p:cNvSpPr>
-            <a:spLocks noGrp="1"/>
-          </p:cNvSpPr>
-          <p:nvPr>
-            <p:ph type="title"/>
-          </p:nvPr>
-        </p:nvSpPr>
-        <p:spPr>
-          <a:xfrm>
-            <a:off x="457200" y="85779"/>
-            <a:ext cx="8229600" cy="1536393"/>
-          </a:xfrm>
-        </p:spPr>
-        <p:txBody>
-          <a:bodyPr>
-            <a:normAutofit/>
-          </a:bodyPr>
-          <a:lstStyle/>
-          <a:p>
-            <a:pPr algn="l"/>
-            <a:r>
-              <a:rPr lang="de-DE" dirty="0" smtClean="0"/>
-              <a:t>Historie (1)</a:t>
-            </a:r>
-            <a:br>
-              <a:rPr lang="de-DE" dirty="0" smtClean="0"/>
-            </a:br>
-            <a:r>
-              <a:rPr lang="de-DE" dirty="0" smtClean="0"/>
-              <a:t>Systeme...</a:t>
-            </a:r>
-            <a:endParaRPr lang="de-DE" dirty="0"/>
-          </a:p>
-        </p:txBody>
-      </p:sp>
       <p:cxnSp>
         <p:nvCxnSpPr>
           <p:cNvPr id="5" name="Gerade Verbindung mit Pfeil 4"/>
@@ -3439,14 +3389,26 @@
             <a:pPr algn="ctr"/>
             <a:r>
               <a:rPr lang="de-DE" sz="1600" dirty="0" smtClean="0"/>
-              <a:t>B.O.S.S</a:t>
+              <a:t>SAMM </a:t>
+            </a:r>
+            <a:r>
+              <a:rPr lang="de-DE" sz="1600" dirty="0" err="1" smtClean="0"/>
+              <a:t>Sales</a:t>
+            </a:r>
+            <a:r>
+              <a:rPr lang="de-DE" sz="1600" smtClean="0"/>
+              <a:t/>
             </a:r>
             <a:br>
+              <a:rPr lang="de-DE" sz="1600" smtClean="0"/>
+            </a:br>
+            <a:r>
+              <a:rPr lang="de-DE" sz="1600" smtClean="0"/>
+              <a:t>(</a:t>
+            </a:r>
+            <a:r>
               <a:rPr lang="de-DE" sz="1600" dirty="0" smtClean="0"/>
-            </a:br>
-            <a:r>
-              <a:rPr lang="de-DE" sz="1600" dirty="0" smtClean="0"/>
-              <a:t>(Java &amp; Co)</a:t>
+              <a:t>Java &amp; Co)</a:t>
             </a:r>
             <a:endParaRPr lang="de-DE" sz="1600" dirty="0"/>
           </a:p>
@@ -3637,8 +3599,8 @@
           <a:p>
             <a:pPr algn="ctr"/>
             <a:r>
-              <a:rPr lang="de-DE" sz="2400" b="1" dirty="0" err="1" smtClean="0"/>
-              <a:t>i.B.O.S.S</a:t>
+              <a:rPr lang="de-DE" sz="2400" b="1" dirty="0" smtClean="0"/>
+              <a:t>VENOM</a:t>
             </a:r>
             <a:r>
               <a:rPr lang="de-DE" sz="2000" dirty="0" smtClean="0"/>

</xml_diff>

<commit_message>
updated business history, moved to own ppt
</commit_message>
<xml_diff>
--- a/graphics/venom-diagrams.pptx
+++ b/graphics/venom-diagrams.pptx
@@ -201,7 +201,7 @@
           <a:p>
             <a:fld id="{1C8FE042-0B66-6B40-B0E0-26B8EBC13308}" type="datetimeFigureOut">
               <a:rPr lang="de-DE" smtClean="0"/>
-              <a:t>11.04.15</a:t>
+              <a:t>18.04.15</a:t>
             </a:fld>
             <a:endParaRPr lang="de-DE"/>
           </a:p>
@@ -4053,44 +4053,6 @@
           <a:chExt cx="0" cy="0"/>
         </a:xfrm>
       </p:grpSpPr>
-      <p:sp>
-        <p:nvSpPr>
-          <p:cNvPr id="2" name="Titel 1"/>
-          <p:cNvSpPr>
-            <a:spLocks noGrp="1"/>
-          </p:cNvSpPr>
-          <p:nvPr>
-            <p:ph type="title"/>
-          </p:nvPr>
-        </p:nvSpPr>
-        <p:spPr>
-          <a:xfrm>
-            <a:off x="457200" y="85779"/>
-            <a:ext cx="8229600" cy="1536393"/>
-          </a:xfrm>
-        </p:spPr>
-        <p:txBody>
-          <a:bodyPr>
-            <a:normAutofit/>
-          </a:bodyPr>
-          <a:lstStyle/>
-          <a:p>
-            <a:pPr algn="l"/>
-            <a:r>
-              <a:rPr lang="de-DE" dirty="0" smtClean="0"/>
-              <a:t>Historie (2)</a:t>
-            </a:r>
-            <a:br>
-              <a:rPr lang="de-DE" dirty="0" smtClean="0"/>
-            </a:br>
-            <a:r>
-              <a:rPr lang="de-DE" dirty="0" smtClean="0"/>
-              <a:t>Unternehmen...</a:t>
-            </a:r>
-            <a:endParaRPr lang="de-DE" dirty="0"/>
-          </a:p>
-        </p:txBody>
-      </p:sp>
       <p:cxnSp>
         <p:nvCxnSpPr>
           <p:cNvPr id="5" name="Gerade Verbindung mit Pfeil 4"/>
@@ -4842,7 +4804,7 @@
             <a:pPr algn="ctr"/>
             <a:r>
               <a:rPr lang="de-DE" sz="2400" b="1" dirty="0" smtClean="0"/>
-              <a:t>Rot-Gelb</a:t>
+              <a:t>SAMM</a:t>
             </a:r>
             <a:r>
               <a:rPr lang="de-DE" sz="2000" dirty="0" smtClean="0"/>

</xml_diff>